<commit_message>
Literaturrecherche, Arbeit an Seminararbeit, Durcharbeiten von Tutorials und Litaratur zur Bewältung der Praktikumsaufgabe.
</commit_message>
<xml_diff>
--- a/Zwischenpräsentation.pptx
+++ b/Zwischenpräsentation.pptx
@@ -115,6 +115,11 @@
       </a:defRPr>
     </a:lvl9pPr>
   </p:defaultTextStyle>
+  <p:extLst>
+    <p:ext uri="{EFAFB233-063F-42B5-8137-9DF3F51BA10A}">
+      <p15:sldGuideLst xmlns:p15="http://schemas.microsoft.com/office/powerpoint/2012/main"/>
+    </p:ext>
+  </p:extLst>
 </p:presentation>
 </file>
 
@@ -200,7 +205,7 @@
           <a:p>
             <a:fld id="{617A1C96-BDE3-4738-9A62-8318BAA3DCE7}" type="datetimeFigureOut">
               <a:rPr lang="de-DE" smtClean="0"/>
-              <a:t>14.05.2016</a:t>
+              <a:t>15.05.2016</a:t>
             </a:fld>
             <a:endParaRPr lang="de-DE"/>
           </a:p>
@@ -295,7 +300,6 @@
               <a:rPr lang="de-DE"/>
               <a:t>Fünfte Ebene</a:t>
             </a:r>
-            <a:endParaRPr lang="de-DE"/>
           </a:p>
         </p:txBody>
       </p:sp>
@@ -925,8 +929,18 @@
               <a:t>Eclipse</a:t>
             </a:r>
             <a:r>
+              <a:rPr lang="de-DE" baseline="0" dirty="0"/>
+              <a:t> Papyrus</a:t>
+            </a:r>
+          </a:p>
+          <a:p>
+            <a:r>
+              <a:rPr lang="de-DE" baseline="0" dirty="0"/>
+              <a:t>- Ich habe bereits </a:t>
+            </a:r>
+            <a:r>
               <a:rPr lang="de-DE" baseline="0"/>
-              <a:t> Papyrus</a:t>
+              <a:t>Beispiele umgesetzt</a:t>
             </a:r>
             <a:endParaRPr lang="de-DE" dirty="0"/>
           </a:p>
@@ -1651,7 +1665,7 @@
           <a:p>
             <a:fld id="{A4015E42-5BA5-4995-84B8-7A03EB60BAB0}" type="datetimeFigureOut">
               <a:rPr lang="de-DE" smtClean="0"/>
-              <a:t>14.05.2016</a:t>
+              <a:t>15.05.2016</a:t>
             </a:fld>
             <a:endParaRPr lang="de-DE"/>
           </a:p>
@@ -1985,7 +1999,7 @@
           <a:p>
             <a:fld id="{A4015E42-5BA5-4995-84B8-7A03EB60BAB0}" type="datetimeFigureOut">
               <a:rPr lang="de-DE" smtClean="0"/>
-              <a:t>14.05.2016</a:t>
+              <a:t>15.05.2016</a:t>
             </a:fld>
             <a:endParaRPr lang="de-DE"/>
           </a:p>
@@ -2263,7 +2277,7 @@
           <a:p>
             <a:fld id="{A4015E42-5BA5-4995-84B8-7A03EB60BAB0}" type="datetimeFigureOut">
               <a:rPr lang="de-DE" smtClean="0"/>
-              <a:t>14.05.2016</a:t>
+              <a:t>15.05.2016</a:t>
             </a:fld>
             <a:endParaRPr lang="de-DE"/>
           </a:p>
@@ -2831,7 +2845,7 @@
           <a:p>
             <a:fld id="{A4015E42-5BA5-4995-84B8-7A03EB60BAB0}" type="datetimeFigureOut">
               <a:rPr lang="de-DE" smtClean="0"/>
-              <a:t>14.05.2016</a:t>
+              <a:t>15.05.2016</a:t>
             </a:fld>
             <a:endParaRPr lang="de-DE"/>
           </a:p>
@@ -3109,7 +3123,7 @@
           <a:p>
             <a:fld id="{A4015E42-5BA5-4995-84B8-7A03EB60BAB0}" type="datetimeFigureOut">
               <a:rPr lang="de-DE" smtClean="0"/>
-              <a:t>14.05.2016</a:t>
+              <a:t>15.05.2016</a:t>
             </a:fld>
             <a:endParaRPr lang="de-DE"/>
           </a:p>
@@ -3671,7 +3685,7 @@
           <a:p>
             <a:fld id="{A4015E42-5BA5-4995-84B8-7A03EB60BAB0}" type="datetimeFigureOut">
               <a:rPr lang="de-DE" smtClean="0"/>
-              <a:t>14.05.2016</a:t>
+              <a:t>15.05.2016</a:t>
             </a:fld>
             <a:endParaRPr lang="de-DE"/>
           </a:p>
@@ -3998,7 +4012,7 @@
           <a:p>
             <a:fld id="{A4015E42-5BA5-4995-84B8-7A03EB60BAB0}" type="datetimeFigureOut">
               <a:rPr lang="de-DE" smtClean="0"/>
-              <a:t>14.05.2016</a:t>
+              <a:t>15.05.2016</a:t>
             </a:fld>
             <a:endParaRPr lang="de-DE"/>
           </a:p>
@@ -4175,7 +4189,7 @@
           <a:p>
             <a:fld id="{A4015E42-5BA5-4995-84B8-7A03EB60BAB0}" type="datetimeFigureOut">
               <a:rPr lang="de-DE" smtClean="0"/>
-              <a:t>14.05.2016</a:t>
+              <a:t>15.05.2016</a:t>
             </a:fld>
             <a:endParaRPr lang="de-DE"/>
           </a:p>
@@ -4413,7 +4427,7 @@
           <a:p>
             <a:fld id="{A4015E42-5BA5-4995-84B8-7A03EB60BAB0}" type="datetimeFigureOut">
               <a:rPr lang="de-DE" smtClean="0"/>
-              <a:t>14.05.2016</a:t>
+              <a:t>15.05.2016</a:t>
             </a:fld>
             <a:endParaRPr lang="de-DE"/>
           </a:p>
@@ -4613,7 +4627,7 @@
           <a:p>
             <a:fld id="{A4015E42-5BA5-4995-84B8-7A03EB60BAB0}" type="datetimeFigureOut">
               <a:rPr lang="de-DE" smtClean="0"/>
-              <a:t>14.05.2016</a:t>
+              <a:t>15.05.2016</a:t>
             </a:fld>
             <a:endParaRPr lang="de-DE"/>
           </a:p>
@@ -4889,7 +4903,7 @@
           <a:p>
             <a:fld id="{A4015E42-5BA5-4995-84B8-7A03EB60BAB0}" type="datetimeFigureOut">
               <a:rPr lang="de-DE" smtClean="0"/>
-              <a:t>14.05.2016</a:t>
+              <a:t>15.05.2016</a:t>
             </a:fld>
             <a:endParaRPr lang="de-DE"/>
           </a:p>
@@ -5155,7 +5169,7 @@
           <a:p>
             <a:fld id="{A4015E42-5BA5-4995-84B8-7A03EB60BAB0}" type="datetimeFigureOut">
               <a:rPr lang="de-DE" smtClean="0"/>
-              <a:t>14.05.2016</a:t>
+              <a:t>15.05.2016</a:t>
             </a:fld>
             <a:endParaRPr lang="de-DE"/>
           </a:p>
@@ -5529,7 +5543,7 @@
           <a:p>
             <a:fld id="{A4015E42-5BA5-4995-84B8-7A03EB60BAB0}" type="datetimeFigureOut">
               <a:rPr lang="de-DE" smtClean="0"/>
-              <a:t>14.05.2016</a:t>
+              <a:t>15.05.2016</a:t>
             </a:fld>
             <a:endParaRPr lang="de-DE"/>
           </a:p>
@@ -5677,7 +5691,7 @@
           <a:p>
             <a:fld id="{A4015E42-5BA5-4995-84B8-7A03EB60BAB0}" type="datetimeFigureOut">
               <a:rPr lang="de-DE" smtClean="0"/>
-              <a:t>14.05.2016</a:t>
+              <a:t>15.05.2016</a:t>
             </a:fld>
             <a:endParaRPr lang="de-DE"/>
           </a:p>
@@ -5802,7 +5816,7 @@
           <a:p>
             <a:fld id="{A4015E42-5BA5-4995-84B8-7A03EB60BAB0}" type="datetimeFigureOut">
               <a:rPr lang="de-DE" smtClean="0"/>
-              <a:t>14.05.2016</a:t>
+              <a:t>15.05.2016</a:t>
             </a:fld>
             <a:endParaRPr lang="de-DE"/>
           </a:p>
@@ -6087,7 +6101,7 @@
           <a:p>
             <a:fld id="{A4015E42-5BA5-4995-84B8-7A03EB60BAB0}" type="datetimeFigureOut">
               <a:rPr lang="de-DE" smtClean="0"/>
-              <a:t>14.05.2016</a:t>
+              <a:t>15.05.2016</a:t>
             </a:fld>
             <a:endParaRPr lang="de-DE"/>
           </a:p>
@@ -6411,7 +6425,7 @@
           <a:p>
             <a:fld id="{A4015E42-5BA5-4995-84B8-7A03EB60BAB0}" type="datetimeFigureOut">
               <a:rPr lang="de-DE" smtClean="0"/>
-              <a:t>14.05.2016</a:t>
+              <a:t>15.05.2016</a:t>
             </a:fld>
             <a:endParaRPr lang="de-DE"/>
           </a:p>
@@ -6625,7 +6639,7 @@
           <a:p>
             <a:fld id="{A4015E42-5BA5-4995-84B8-7A03EB60BAB0}" type="datetimeFigureOut">
               <a:rPr lang="de-DE" smtClean="0"/>
-              <a:t>14.05.2016</a:t>
+              <a:t>15.05.2016</a:t>
             </a:fld>
             <a:endParaRPr lang="de-DE"/>
           </a:p>

</xml_diff>